<commit_message>
Updated additional twitter handle
</commit_message>
<xml_diff>
--- a/Scheduling Tweets.pptx
+++ b/Scheduling Tweets.pptx
@@ -113,6 +113,11 @@
       </a:defRPr>
     </a:lvl9pPr>
   </p:defaultTextStyle>
+  <p:extLst>
+    <p:ext uri="{EFAFB233-063F-42B5-8137-9DF3F51BA10A}">
+      <p15:sldGuideLst xmlns:p15="http://schemas.microsoft.com/office/powerpoint/2012/main"/>
+    </p:ext>
+  </p:extLst>
 </p:presentation>
 </file>
 
@@ -6316,6 +6321,18 @@
             <a:pPr algn="l"/>
             <a:r>
               <a:rPr lang="en-US" dirty="0"/>
+              <a:t>Twitter: @</a:t>
+            </a:r>
+            <a:r>
+              <a:rPr lang="en-US"/>
+              <a:t>PSHChatt</a:t>
+            </a:r>
+            <a:endParaRPr lang="en-US" dirty="0"/>
+          </a:p>
+          <a:p>
+            <a:pPr algn="l"/>
+            <a:r>
+              <a:rPr lang="en-US" dirty="0"/>
               <a:t>Github.com/ergo3114</a:t>
             </a:r>
           </a:p>

</xml_diff>